<commit_message>
Updated Test and Trophy Instructions
</commit_message>
<xml_diff>
--- a/Assets/StreamingAssets/2D_Objects/ID/WaterMaze_Online_Threshold.pptx
+++ b/Assets/StreamingAssets/2D_Objects/ID/WaterMaze_Online_Threshold.pptx
@@ -13,7 +13,6 @@
     <p:sldId id="279" r:id="rId7"/>
     <p:sldId id="281" r:id="rId8"/>
     <p:sldId id="287" r:id="rId9"/>
-    <p:sldId id="262" r:id="rId10"/>
   </p:sldIdLst>
   <p:sldSz cx="12192000" cy="6858000"/>
   <p:notesSz cx="6858000" cy="9144000"/>
@@ -278,7 +277,7 @@
           <a:p>
             <a:fld id="{43D9F887-C526-42E2-BE1C-7F1C55940A26}" type="datetimeFigureOut">
               <a:rPr lang="en-US" smtClean="0"/>
-              <a:t>6/3/2020</a:t>
+              <a:t>6/13/2020</a:t>
             </a:fld>
             <a:endParaRPr lang="en-US"/>
           </a:p>
@@ -476,7 +475,7 @@
           <a:p>
             <a:fld id="{43D9F887-C526-42E2-BE1C-7F1C55940A26}" type="datetimeFigureOut">
               <a:rPr lang="en-US" smtClean="0"/>
-              <a:t>6/3/2020</a:t>
+              <a:t>6/13/2020</a:t>
             </a:fld>
             <a:endParaRPr lang="en-US"/>
           </a:p>
@@ -684,7 +683,7 @@
           <a:p>
             <a:fld id="{43D9F887-C526-42E2-BE1C-7F1C55940A26}" type="datetimeFigureOut">
               <a:rPr lang="en-US" smtClean="0"/>
-              <a:t>6/3/2020</a:t>
+              <a:t>6/13/2020</a:t>
             </a:fld>
             <a:endParaRPr lang="en-US"/>
           </a:p>
@@ -882,7 +881,7 @@
           <a:p>
             <a:fld id="{43D9F887-C526-42E2-BE1C-7F1C55940A26}" type="datetimeFigureOut">
               <a:rPr lang="en-US" smtClean="0"/>
-              <a:t>6/3/2020</a:t>
+              <a:t>6/13/2020</a:t>
             </a:fld>
             <a:endParaRPr lang="en-US"/>
           </a:p>
@@ -1157,7 +1156,7 @@
           <a:p>
             <a:fld id="{43D9F887-C526-42E2-BE1C-7F1C55940A26}" type="datetimeFigureOut">
               <a:rPr lang="en-US" smtClean="0"/>
-              <a:t>6/3/2020</a:t>
+              <a:t>6/13/2020</a:t>
             </a:fld>
             <a:endParaRPr lang="en-US"/>
           </a:p>
@@ -1422,7 +1421,7 @@
           <a:p>
             <a:fld id="{43D9F887-C526-42E2-BE1C-7F1C55940A26}" type="datetimeFigureOut">
               <a:rPr lang="en-US" smtClean="0"/>
-              <a:t>6/3/2020</a:t>
+              <a:t>6/13/2020</a:t>
             </a:fld>
             <a:endParaRPr lang="en-US"/>
           </a:p>
@@ -1834,7 +1833,7 @@
           <a:p>
             <a:fld id="{43D9F887-C526-42E2-BE1C-7F1C55940A26}" type="datetimeFigureOut">
               <a:rPr lang="en-US" smtClean="0"/>
-              <a:t>6/3/2020</a:t>
+              <a:t>6/13/2020</a:t>
             </a:fld>
             <a:endParaRPr lang="en-US"/>
           </a:p>
@@ -1975,7 +1974,7 @@
           <a:p>
             <a:fld id="{43D9F887-C526-42E2-BE1C-7F1C55940A26}" type="datetimeFigureOut">
               <a:rPr lang="en-US" smtClean="0"/>
-              <a:t>6/3/2020</a:t>
+              <a:t>6/13/2020</a:t>
             </a:fld>
             <a:endParaRPr lang="en-US"/>
           </a:p>
@@ -2088,7 +2087,7 @@
           <a:p>
             <a:fld id="{43D9F887-C526-42E2-BE1C-7F1C55940A26}" type="datetimeFigureOut">
               <a:rPr lang="en-US" smtClean="0"/>
-              <a:t>6/3/2020</a:t>
+              <a:t>6/13/2020</a:t>
             </a:fld>
             <a:endParaRPr lang="en-US"/>
           </a:p>
@@ -2399,7 +2398,7 @@
           <a:p>
             <a:fld id="{43D9F887-C526-42E2-BE1C-7F1C55940A26}" type="datetimeFigureOut">
               <a:rPr lang="en-US" smtClean="0"/>
-              <a:t>6/3/2020</a:t>
+              <a:t>6/13/2020</a:t>
             </a:fld>
             <a:endParaRPr lang="en-US"/>
           </a:p>
@@ -2687,7 +2686,7 @@
           <a:p>
             <a:fld id="{43D9F887-C526-42E2-BE1C-7F1C55940A26}" type="datetimeFigureOut">
               <a:rPr lang="en-US" smtClean="0"/>
-              <a:t>6/3/2020</a:t>
+              <a:t>6/13/2020</a:t>
             </a:fld>
             <a:endParaRPr lang="en-US"/>
           </a:p>
@@ -2928,7 +2927,7 @@
           <a:p>
             <a:fld id="{43D9F887-C526-42E2-BE1C-7F1C55940A26}" type="datetimeFigureOut">
               <a:rPr lang="en-US" smtClean="0"/>
-              <a:t>6/3/2020</a:t>
+              <a:t>6/13/2020</a:t>
             </a:fld>
             <a:endParaRPr lang="en-US"/>
           </a:p>
@@ -3377,47 +3376,7 @@
                   </a:outerShdw>
                 </a:effectLst>
               </a:rPr>
-              <a:t>Section 3: Find The Trophy!</a:t>
-            </a:r>
-          </a:p>
-        </p:txBody>
-      </p:sp>
-      <p:sp>
-        <p:nvSpPr>
-          <p:cNvPr id="5" name="TextBox 4">
-            <a:extLst>
-              <a:ext uri="{FF2B5EF4-FFF2-40B4-BE49-F238E27FC236}">
-                <a16:creationId xmlns:a16="http://schemas.microsoft.com/office/drawing/2014/main" id="{4CACD45F-AE69-9247-83D9-BCB6E82421C8}"/>
-              </a:ext>
-            </a:extLst>
-          </p:cNvPr>
-          <p:cNvSpPr txBox="1"/>
-          <p:nvPr/>
-        </p:nvSpPr>
-        <p:spPr>
-          <a:xfrm>
-            <a:off x="3641723" y="5973619"/>
-            <a:ext cx="4782193" cy="461665"/>
-          </a:xfrm>
-          <a:prstGeom prst="rect">
-            <a:avLst/>
-          </a:prstGeom>
-          <a:noFill/>
-        </p:spPr>
-        <p:txBody>
-          <a:bodyPr wrap="square" rtlCol="0">
-            <a:spAutoFit/>
-          </a:bodyPr>
-          <a:lstStyle/>
-          <a:p>
-            <a:pPr algn="ctr"/>
-            <a:r>
-              <a:rPr lang="en-US" sz="2400" b="1" dirty="0">
-                <a:solidFill>
-                  <a:schemeClr val="accent6"/>
-                </a:solidFill>
-              </a:rPr>
-              <a:t>Do you have any questions?</a:t>
+              <a:t>Section 2: Find The Trophy!</a:t>
             </a:r>
           </a:p>
         </p:txBody>
@@ -3813,7 +3772,7 @@
               <a:noFill/>
               <a:extLst>
                 <a:ext uri="{909E8E84-426E-40dd-AFC4-6F175D3DCCD1}">
-                  <a14:hiddenFill xmlns="" xmlns:a14="http://schemas.microsoft.com/office/drawing/2010/main">
+                  <a14:hiddenFill xmlns:a14="http://schemas.microsoft.com/office/drawing/2010/main" xmlns="">
                     <a:solidFill>
                       <a:srgbClr val="FFFFFF"/>
                     </a:solidFill>
@@ -5047,7 +5006,7 @@
             <a:noFill/>
             <a:extLst>
               <a:ext uri="{909E8E84-426E-40dd-AFC4-6F175D3DCCD1}">
-                <a14:hiddenFill xmlns:a14="http://schemas.microsoft.com/office/drawing/2010/main" xmlns="">
+                <a14:hiddenFill xmlns="" xmlns:a14="http://schemas.microsoft.com/office/drawing/2010/main">
                   <a:solidFill>
                     <a:srgbClr val="FFFFFF"/>
                   </a:solidFill>
@@ -5092,7 +5051,7 @@
             <a:noFill/>
             <a:extLst>
               <a:ext uri="{909E8E84-426E-40dd-AFC4-6F175D3DCCD1}">
-                <a14:hiddenFill xmlns:a14="http://schemas.microsoft.com/office/drawing/2010/main" xmlns="">
+                <a14:hiddenFill xmlns="" xmlns:a14="http://schemas.microsoft.com/office/drawing/2010/main">
                   <a:solidFill>
                     <a:srgbClr val="FFFFFF"/>
                   </a:solidFill>
@@ -5137,7 +5096,7 @@
             <a:noFill/>
             <a:extLst>
               <a:ext uri="{909E8E84-426E-40dd-AFC4-6F175D3DCCD1}">
-                <a14:hiddenFill xmlns:a14="http://schemas.microsoft.com/office/drawing/2010/main" xmlns="">
+                <a14:hiddenFill xmlns="" xmlns:a14="http://schemas.microsoft.com/office/drawing/2010/main">
                   <a:solidFill>
                     <a:srgbClr val="FFFFFF"/>
                   </a:solidFill>
@@ -5230,7 +5189,7 @@
         </p:nvSpPr>
         <p:spPr>
           <a:xfrm>
-            <a:off x="0" y="560911"/>
+            <a:off x="0" y="313776"/>
             <a:ext cx="12192000" cy="5353010"/>
           </a:xfrm>
         </p:spPr>
@@ -5273,7 +5232,7 @@
             </a:pPr>
             <a:r>
               <a:rPr lang="en-US" sz="3000" strike="sngStrike" dirty="0"/>
-              <a:t>Practice</a:t>
+              <a:t>Bonus Pay</a:t>
             </a:r>
           </a:p>
           <a:p>
@@ -5283,7 +5242,7 @@
             </a:pPr>
             <a:r>
               <a:rPr lang="en-US" sz="3000" strike="sngStrike" dirty="0"/>
-              <a:t>Bonus Pay</a:t>
+              <a:t>Find The Trophy</a:t>
             </a:r>
           </a:p>
           <a:p>
@@ -5292,16 +5251,6 @@
               <a:buAutoNum type="arabicPeriod"/>
             </a:pPr>
             <a:r>
-              <a:rPr lang="en-US" sz="3000" strike="sngStrike" dirty="0"/>
-              <a:t>Find The Trophy</a:t>
-            </a:r>
-          </a:p>
-          <a:p>
-            <a:pPr marL="4400550" lvl="8" indent="-742950">
-              <a:buFont typeface="+mj-lt"/>
-              <a:buAutoNum type="arabicPeriod"/>
-            </a:pPr>
-            <a:r>
               <a:rPr lang="en-US" sz="3000" b="1" dirty="0"/>
               <a:t>Survey</a:t>
             </a:r>
@@ -5317,10 +5266,55 @@
               <a:buNone/>
             </a:pPr>
             <a:r>
-              <a:rPr lang="en-US" dirty="0"/>
-              <a:t>Please fill out the survey to complete the experiment.</a:t>
-            </a:r>
-            <a:endParaRPr lang="en-US" sz="2400" dirty="0"/>
+              <a:rPr lang="en-US" sz="3600" b="1" dirty="0">
+                <a:solidFill>
+                  <a:srgbClr val="C00000"/>
+                </a:solidFill>
+              </a:rPr>
+              <a:t>Please notify the experimenter! </a:t>
+            </a:r>
+          </a:p>
+          <a:p>
+            <a:pPr marL="0" indent="0" algn="ctr">
+              <a:buNone/>
+            </a:pPr>
+            <a:r>
+              <a:rPr lang="en-US" sz="3600" b="1" dirty="0">
+                <a:solidFill>
+                  <a:srgbClr val="C00000"/>
+                </a:solidFill>
+              </a:rPr>
+              <a:t>Do not </a:t>
+            </a:r>
+            <a:r>
+              <a:rPr lang="en-US" sz="3600" dirty="0">
+                <a:solidFill>
+                  <a:srgbClr val="C00000"/>
+                </a:solidFill>
+              </a:rPr>
+              <a:t>press</a:t>
+            </a:r>
+            <a:r>
+              <a:rPr lang="en-US" sz="3600" b="1" dirty="0">
+                <a:solidFill>
+                  <a:srgbClr val="C00000"/>
+                </a:solidFill>
+              </a:rPr>
+              <a:t> </a:t>
+            </a:r>
+            <a:r>
+              <a:rPr lang="en-US" sz="3600" dirty="0">
+                <a:solidFill>
+                  <a:srgbClr val="C00000"/>
+                </a:solidFill>
+              </a:rPr>
+              <a:t>the survey button below until you have been instructed to by the experimenter!</a:t>
+            </a:r>
+            <a:endParaRPr lang="en-US" sz="3200" dirty="0">
+              <a:solidFill>
+                <a:srgbClr val="C00000"/>
+              </a:solidFill>
+            </a:endParaRPr>
           </a:p>
         </p:txBody>
       </p:sp>
@@ -5328,82 +5322,6 @@
     <p:extLst>
       <p:ext uri="{BB962C8B-B14F-4D97-AF65-F5344CB8AC3E}">
         <p14:creationId xmlns:p14="http://schemas.microsoft.com/office/powerpoint/2010/main" val="136332127"/>
-      </p:ext>
-    </p:extLst>
-  </p:cSld>
-  <p:clrMapOvr>
-    <a:masterClrMapping/>
-  </p:clrMapOvr>
-</p:sld>
-</file>
-
-<file path=ppt/slides/slide9.xml><?xml version="1.0" encoding="utf-8"?>
-<p:sld xmlns:a="http://schemas.openxmlformats.org/drawingml/2006/main" xmlns:r="http://schemas.openxmlformats.org/officeDocument/2006/relationships" xmlns:p="http://schemas.openxmlformats.org/presentationml/2006/main">
-  <p:cSld>
-    <p:spTree>
-      <p:nvGrpSpPr>
-        <p:cNvPr id="1" name=""/>
-        <p:cNvGrpSpPr/>
-        <p:nvPr/>
-      </p:nvGrpSpPr>
-      <p:grpSpPr>
-        <a:xfrm>
-          <a:off x="0" y="0"/>
-          <a:ext cx="0" cy="0"/>
-          <a:chOff x="0" y="0"/>
-          <a:chExt cx="0" cy="0"/>
-        </a:xfrm>
-      </p:grpSpPr>
-      <p:sp>
-        <p:nvSpPr>
-          <p:cNvPr id="2" name="Title 1">
-            <a:extLst>
-              <a:ext uri="{FF2B5EF4-FFF2-40B4-BE49-F238E27FC236}">
-                <a16:creationId xmlns:a16="http://schemas.microsoft.com/office/drawing/2014/main" id="{897D8E5E-9252-4150-97C4-51C3C2C38837}"/>
-              </a:ext>
-            </a:extLst>
-          </p:cNvPr>
-          <p:cNvSpPr>
-            <a:spLocks noGrp="1"/>
-          </p:cNvSpPr>
-          <p:nvPr>
-            <p:ph type="title"/>
-          </p:nvPr>
-        </p:nvSpPr>
-        <p:spPr>
-          <a:xfrm>
-            <a:off x="838200" y="1960306"/>
-            <a:ext cx="10515600" cy="2343056"/>
-          </a:xfrm>
-        </p:spPr>
-        <p:txBody>
-          <a:bodyPr>
-            <a:normAutofit fontScale="90000"/>
-          </a:bodyPr>
-          <a:lstStyle/>
-          <a:p>
-            <a:pPr algn="ctr"/>
-            <a:r>
-              <a:rPr lang="en-US" b="1" dirty="0"/>
-              <a:t>Great Work!</a:t>
-            </a:r>
-            <a:br>
-              <a:rPr lang="en-US" dirty="0"/>
-            </a:br>
-            <a:br>
-              <a:rPr lang="en-US" dirty="0"/>
-            </a:br>
-            <a:r>
-              <a:rPr lang="en-US" dirty="0"/>
-              <a:t>You have completed the task. The final part of the experiment is a questionnaire. </a:t>
-            </a:r>
-          </a:p>
-        </p:txBody>
-      </p:sp>
-    </p:spTree>
-    <p:extLst>
-      <p:ext uri="{BB962C8B-B14F-4D97-AF65-F5344CB8AC3E}">
-        <p14:creationId xmlns:p14="http://schemas.microsoft.com/office/powerpoint/2010/main" val="448000115"/>
       </p:ext>
     </p:extLst>
   </p:cSld>

</xml_diff>

<commit_message>
Test Configuration files ready for testing
</commit_message>
<xml_diff>
--- a/Assets/StreamingAssets/2D_Objects/ID/WaterMaze_Online_Threshold.pptx
+++ b/Assets/StreamingAssets/2D_Objects/ID/WaterMaze_Online_Threshold.pptx
@@ -9,10 +9,10 @@
     <p:sldId id="256" r:id="rId3"/>
     <p:sldId id="302" r:id="rId4"/>
     <p:sldId id="278" r:id="rId5"/>
-    <p:sldId id="268" r:id="rId6"/>
-    <p:sldId id="279" r:id="rId7"/>
-    <p:sldId id="281" r:id="rId8"/>
-    <p:sldId id="287" r:id="rId9"/>
+    <p:sldId id="281" r:id="rId6"/>
+    <p:sldId id="268" r:id="rId7"/>
+    <p:sldId id="287" r:id="rId8"/>
+    <p:sldId id="279" r:id="rId9"/>
   </p:sldIdLst>
   <p:sldSz cx="12192000" cy="6858000"/>
   <p:notesSz cx="6858000" cy="9144000"/>
@@ -3772,7 +3772,7 @@
               <a:noFill/>
               <a:extLst>
                 <a:ext uri="{909E8E84-426E-40dd-AFC4-6F175D3DCCD1}">
-                  <a14:hiddenFill xmlns:a14="http://schemas.microsoft.com/office/drawing/2010/main" xmlns="">
+                  <a14:hiddenFill xmlns="" xmlns:a14="http://schemas.microsoft.com/office/drawing/2010/main">
                     <a:solidFill>
                       <a:srgbClr val="FFFFFF"/>
                     </a:solidFill>
@@ -4109,8 +4109,8 @@
         </p:nvSpPr>
         <p:spPr>
           <a:xfrm>
-            <a:off x="60080" y="173961"/>
-            <a:ext cx="12071839" cy="3425563"/>
+            <a:off x="60080" y="173962"/>
+            <a:ext cx="12071839" cy="2381348"/>
           </a:xfrm>
         </p:spPr>
         <p:txBody>
@@ -4126,11 +4126,6 @@
               <a:rPr lang="en-US" sz="3600" dirty="0"/>
               <a:t>FIND THE TROPHY!</a:t>
             </a:r>
-          </a:p>
-          <a:p>
-            <a:pPr marL="0" indent="0" algn="ctr">
-              <a:buNone/>
-            </a:pPr>
             <a:endParaRPr lang="en-US" sz="3600" b="1" dirty="0"/>
           </a:p>
           <a:p>
@@ -4169,12 +4164,6 @@
               <a:rPr lang="en-US" dirty="0"/>
               <a:t>Screen and then you will be placed into the environment at a random location. Your job is to collect the trophy as fast as you can by running into it! </a:t>
             </a:r>
-          </a:p>
-          <a:p>
-            <a:pPr marL="0" indent="0" algn="ctr">
-              <a:buNone/>
-            </a:pPr>
-            <a:endParaRPr lang="en-US" b="1" dirty="0"/>
           </a:p>
         </p:txBody>
       </p:sp>
@@ -4186,7 +4175,7 @@
         </p:nvGrpSpPr>
         <p:grpSpPr>
           <a:xfrm>
-            <a:off x="5569381" y="3235643"/>
+            <a:off x="5381490" y="3099662"/>
             <a:ext cx="4798643" cy="1908548"/>
             <a:chOff x="5540188" y="3907209"/>
             <a:chExt cx="4798643" cy="1908548"/>
@@ -4303,7 +4292,7 @@
         </p:blipFill>
         <p:spPr>
           <a:xfrm>
-            <a:off x="1915515" y="3235660"/>
+            <a:off x="1727624" y="3099679"/>
             <a:ext cx="3414724" cy="1908531"/>
           </a:xfrm>
           <a:prstGeom prst="rect">
@@ -4338,7 +4327,7 @@
         </p:nvSpPr>
         <p:spPr>
           <a:xfrm>
-            <a:off x="3641723" y="5973619"/>
+            <a:off x="3541514" y="5854184"/>
             <a:ext cx="4782193" cy="461665"/>
           </a:xfrm>
           <a:prstGeom prst="rect">
@@ -4378,457 +4367,6 @@
 </file>
 
 <file path=ppt/slides/slide5.xml><?xml version="1.0" encoding="utf-8"?>
-<p:sld xmlns:a="http://schemas.openxmlformats.org/drawingml/2006/main" xmlns:r="http://schemas.openxmlformats.org/officeDocument/2006/relationships" xmlns:p="http://schemas.openxmlformats.org/presentationml/2006/main">
-  <p:cSld>
-    <p:spTree>
-      <p:nvGrpSpPr>
-        <p:cNvPr id="1" name=""/>
-        <p:cNvGrpSpPr/>
-        <p:nvPr/>
-      </p:nvGrpSpPr>
-      <p:grpSpPr>
-        <a:xfrm>
-          <a:off x="0" y="0"/>
-          <a:ext cx="0" cy="0"/>
-          <a:chOff x="0" y="0"/>
-          <a:chExt cx="0" cy="0"/>
-        </a:xfrm>
-      </p:grpSpPr>
-      <p:sp>
-        <p:nvSpPr>
-          <p:cNvPr id="3" name="Content Placeholder 2">
-            <a:extLst>
-              <a:ext uri="{FF2B5EF4-FFF2-40B4-BE49-F238E27FC236}">
-                <a16:creationId xmlns:a16="http://schemas.microsoft.com/office/drawing/2014/main" id="{B7F24AF1-4C98-47B6-90F9-12C57415B17F}"/>
-              </a:ext>
-            </a:extLst>
-          </p:cNvPr>
-          <p:cNvSpPr>
-            <a:spLocks noGrp="1"/>
-          </p:cNvSpPr>
-          <p:nvPr>
-            <p:ph idx="1"/>
-          </p:nvPr>
-        </p:nvSpPr>
-        <p:spPr>
-          <a:xfrm>
-            <a:off x="60080" y="148909"/>
-            <a:ext cx="12071839" cy="3425563"/>
-          </a:xfrm>
-        </p:spPr>
-        <p:txBody>
-          <a:bodyPr>
-            <a:normAutofit fontScale="92500" lnSpcReduction="10000"/>
-          </a:bodyPr>
-          <a:lstStyle/>
-          <a:p>
-            <a:pPr marL="0" indent="0" algn="ctr">
-              <a:buNone/>
-            </a:pPr>
-            <a:r>
-              <a:rPr lang="en-US" sz="3600" dirty="0"/>
-              <a:t>INVISIBLE ROUNDS</a:t>
-            </a:r>
-          </a:p>
-          <a:p>
-            <a:pPr marL="0" indent="0" algn="ctr">
-              <a:buNone/>
-            </a:pPr>
-            <a:endParaRPr lang="en-US" sz="3000" b="1" dirty="0"/>
-          </a:p>
-          <a:p>
-            <a:pPr marL="0" indent="0" algn="ctr">
-              <a:buNone/>
-            </a:pPr>
-            <a:r>
-              <a:rPr lang="en-US" dirty="0"/>
-              <a:t>Now that you know where the trophy can be found you will need to locate it when it's </a:t>
-            </a:r>
-            <a:r>
-              <a:rPr lang="en-US" dirty="0">
-                <a:solidFill>
-                  <a:srgbClr val="FF0000"/>
-                </a:solidFill>
-              </a:rPr>
-              <a:t>invisible</a:t>
-            </a:r>
-            <a:r>
-              <a:rPr lang="en-US" dirty="0"/>
-              <a:t>.</a:t>
-            </a:r>
-            <a:r>
-              <a:rPr lang="en-US" dirty="0">
-                <a:solidFill>
-                  <a:srgbClr val="FF0000"/>
-                </a:solidFill>
-              </a:rPr>
-              <a:t> </a:t>
-            </a:r>
-            <a:r>
-              <a:rPr lang="en-US" dirty="0"/>
-              <a:t>On each round, you will first see the “</a:t>
-            </a:r>
-            <a:r>
-              <a:rPr lang="en-US" b="1" dirty="0"/>
-              <a:t>Find The Trophy!” </a:t>
-            </a:r>
-            <a:r>
-              <a:rPr lang="en-US" dirty="0"/>
-              <a:t>screen and then you will be placed into the environment at a random location. </a:t>
-            </a:r>
-          </a:p>
-          <a:p>
-            <a:pPr marL="0" indent="0" algn="ctr">
-              <a:buNone/>
-            </a:pPr>
-            <a:r>
-              <a:rPr lang="en-US" dirty="0"/>
-              <a:t>When you find it you will hear a sound and the round will end. </a:t>
-            </a:r>
-          </a:p>
-          <a:p>
-            <a:pPr marL="0" indent="0" algn="ctr">
-              <a:buNone/>
-            </a:pPr>
-            <a:endParaRPr lang="en-US" b="1" dirty="0"/>
-          </a:p>
-          <a:p>
-            <a:pPr marL="0" indent="0" algn="ctr">
-              <a:buNone/>
-            </a:pPr>
-            <a:r>
-              <a:rPr lang="en-US" b="1" dirty="0"/>
-              <a:t>The goal on each round is to find the trophy as fast as possible!!</a:t>
-            </a:r>
-          </a:p>
-        </p:txBody>
-      </p:sp>
-      <p:grpSp>
-        <p:nvGrpSpPr>
-          <p:cNvPr id="8" name="Group 7">
-            <a:extLst>
-              <a:ext uri="{FF2B5EF4-FFF2-40B4-BE49-F238E27FC236}">
-                <a16:creationId xmlns:a16="http://schemas.microsoft.com/office/drawing/2014/main" id="{876D5603-3BAE-45E5-8958-1244B5EC53A7}"/>
-              </a:ext>
-            </a:extLst>
-          </p:cNvPr>
-          <p:cNvGrpSpPr/>
-          <p:nvPr/>
-        </p:nvGrpSpPr>
-        <p:grpSpPr>
-          <a:xfrm>
-            <a:off x="5471410" y="3754075"/>
-            <a:ext cx="4798643" cy="1908548"/>
-            <a:chOff x="5540188" y="3907209"/>
-            <a:chExt cx="4798643" cy="1908548"/>
-          </a:xfrm>
-        </p:grpSpPr>
-        <p:pic>
-          <p:nvPicPr>
-            <p:cNvPr id="9" name="Picture 8">
-              <a:extLst>
-                <a:ext uri="{FF2B5EF4-FFF2-40B4-BE49-F238E27FC236}">
-                  <a16:creationId xmlns:a16="http://schemas.microsoft.com/office/drawing/2014/main" id="{F2C99771-F517-493B-8816-CBE725705682}"/>
-                </a:ext>
-              </a:extLst>
-            </p:cNvPr>
-            <p:cNvPicPr>
-              <a:picLocks noChangeAspect="1"/>
-            </p:cNvPicPr>
-            <p:nvPr/>
-          </p:nvPicPr>
-          <p:blipFill>
-            <a:blip r:embed="rId2"/>
-            <a:stretch>
-              <a:fillRect/>
-            </a:stretch>
-          </p:blipFill>
-          <p:spPr>
-            <a:xfrm>
-              <a:off x="6940084" y="3907209"/>
-              <a:ext cx="3398747" cy="1908548"/>
-            </a:xfrm>
-            <a:prstGeom prst="rect">
-              <a:avLst/>
-            </a:prstGeom>
-            <a:ln w="38100" cap="sq">
-              <a:solidFill>
-                <a:srgbClr val="000000"/>
-              </a:solidFill>
-              <a:prstDash val="solid"/>
-              <a:miter lim="800000"/>
-            </a:ln>
-            <a:effectLst>
-              <a:outerShdw blurRad="50800" dist="38100" dir="2700000" algn="tl" rotWithShape="0">
-                <a:srgbClr val="000000">
-                  <a:alpha val="43000"/>
-                </a:srgbClr>
-              </a:outerShdw>
-            </a:effectLst>
-          </p:spPr>
-        </p:pic>
-        <p:cxnSp>
-          <p:nvCxnSpPr>
-            <p:cNvPr id="10" name="Straight Arrow Connector 9">
-              <a:extLst>
-                <a:ext uri="{FF2B5EF4-FFF2-40B4-BE49-F238E27FC236}">
-                  <a16:creationId xmlns:a16="http://schemas.microsoft.com/office/drawing/2014/main" id="{2E7CCA76-901A-4DCA-BA43-C5A6A14AD4E4}"/>
-                </a:ext>
-              </a:extLst>
-            </p:cNvPr>
-            <p:cNvCxnSpPr>
-              <a:cxnSpLocks/>
-            </p:cNvCxnSpPr>
-            <p:nvPr/>
-          </p:nvCxnSpPr>
-          <p:spPr>
-            <a:xfrm>
-              <a:off x="5540188" y="4861483"/>
-              <a:ext cx="1246831" cy="0"/>
-            </a:xfrm>
-            <a:prstGeom prst="straightConnector1">
-              <a:avLst/>
-            </a:prstGeom>
-            <a:ln w="57150">
-              <a:solidFill>
-                <a:schemeClr val="tx1"/>
-              </a:solidFill>
-              <a:tailEnd type="triangle"/>
-            </a:ln>
-          </p:spPr>
-          <p:style>
-            <a:lnRef idx="1">
-              <a:schemeClr val="accent1"/>
-            </a:lnRef>
-            <a:fillRef idx="0">
-              <a:schemeClr val="accent1"/>
-            </a:fillRef>
-            <a:effectRef idx="0">
-              <a:schemeClr val="accent1"/>
-            </a:effectRef>
-            <a:fontRef idx="minor">
-              <a:schemeClr val="tx1"/>
-            </a:fontRef>
-          </p:style>
-        </p:cxnSp>
-      </p:grpSp>
-      <p:pic>
-        <p:nvPicPr>
-          <p:cNvPr id="11" name="Picture 10">
-            <a:extLst>
-              <a:ext uri="{FF2B5EF4-FFF2-40B4-BE49-F238E27FC236}">
-                <a16:creationId xmlns:a16="http://schemas.microsoft.com/office/drawing/2014/main" id="{0263B739-D44B-43B7-AA01-45DC07CBBB73}"/>
-              </a:ext>
-            </a:extLst>
-          </p:cNvPr>
-          <p:cNvPicPr>
-            <a:picLocks noChangeAspect="1"/>
-          </p:cNvPicPr>
-          <p:nvPr/>
-        </p:nvPicPr>
-        <p:blipFill>
-          <a:blip r:embed="rId3"/>
-          <a:stretch>
-            <a:fillRect/>
-          </a:stretch>
-        </p:blipFill>
-        <p:spPr>
-          <a:xfrm>
-            <a:off x="1817544" y="3754092"/>
-            <a:ext cx="3414724" cy="1908531"/>
-          </a:xfrm>
-          <a:prstGeom prst="rect">
-            <a:avLst/>
-          </a:prstGeom>
-          <a:ln w="38100" cap="sq">
-            <a:solidFill>
-              <a:srgbClr val="000000"/>
-            </a:solidFill>
-            <a:miter lim="800000"/>
-          </a:ln>
-          <a:effectLst>
-            <a:outerShdw blurRad="57150" dist="50800" dir="2700000" algn="tl" rotWithShape="0">
-              <a:srgbClr val="000000">
-                <a:alpha val="40000"/>
-              </a:srgbClr>
-            </a:outerShdw>
-          </a:effectLst>
-        </p:spPr>
-      </p:pic>
-      <p:sp>
-        <p:nvSpPr>
-          <p:cNvPr id="12" name="TextBox 11">
-            <a:extLst>
-              <a:ext uri="{FF2B5EF4-FFF2-40B4-BE49-F238E27FC236}">
-                <a16:creationId xmlns:a16="http://schemas.microsoft.com/office/drawing/2014/main" id="{FA6400F7-6459-634D-BE21-B21692B2875A}"/>
-              </a:ext>
-            </a:extLst>
-          </p:cNvPr>
-          <p:cNvSpPr txBox="1"/>
-          <p:nvPr/>
-        </p:nvSpPr>
-        <p:spPr>
-          <a:xfrm>
-            <a:off x="3641723" y="5973619"/>
-            <a:ext cx="4782193" cy="461665"/>
-          </a:xfrm>
-          <a:prstGeom prst="rect">
-            <a:avLst/>
-          </a:prstGeom>
-          <a:noFill/>
-        </p:spPr>
-        <p:txBody>
-          <a:bodyPr wrap="square" rtlCol="0">
-            <a:spAutoFit/>
-          </a:bodyPr>
-          <a:lstStyle/>
-          <a:p>
-            <a:pPr algn="ctr"/>
-            <a:r>
-              <a:rPr lang="en-US" sz="2400" b="1" dirty="0">
-                <a:solidFill>
-                  <a:schemeClr val="accent6"/>
-                </a:solidFill>
-              </a:rPr>
-              <a:t>Do you have any questions?</a:t>
-            </a:r>
-          </a:p>
-        </p:txBody>
-      </p:sp>
-    </p:spTree>
-    <p:extLst>
-      <p:ext uri="{BB962C8B-B14F-4D97-AF65-F5344CB8AC3E}">
-        <p14:creationId xmlns:p14="http://schemas.microsoft.com/office/powerpoint/2010/main" val="4248979816"/>
-      </p:ext>
-    </p:extLst>
-  </p:cSld>
-  <p:clrMapOvr>
-    <a:masterClrMapping/>
-  </p:clrMapOvr>
-</p:sld>
-</file>
-
-<file path=ppt/slides/slide6.xml><?xml version="1.0" encoding="utf-8"?>
-<p:sld xmlns:a="http://schemas.openxmlformats.org/drawingml/2006/main" xmlns:r="http://schemas.openxmlformats.org/officeDocument/2006/relationships" xmlns:p="http://schemas.openxmlformats.org/presentationml/2006/main">
-  <p:cSld>
-    <p:spTree>
-      <p:nvGrpSpPr>
-        <p:cNvPr id="1" name=""/>
-        <p:cNvGrpSpPr/>
-        <p:nvPr/>
-      </p:nvGrpSpPr>
-      <p:grpSpPr>
-        <a:xfrm>
-          <a:off x="0" y="0"/>
-          <a:ext cx="0" cy="0"/>
-          <a:chOff x="0" y="0"/>
-          <a:chExt cx="0" cy="0"/>
-        </a:xfrm>
-      </p:grpSpPr>
-      <p:sp>
-        <p:nvSpPr>
-          <p:cNvPr id="2" name="Title 1">
-            <a:extLst>
-              <a:ext uri="{FF2B5EF4-FFF2-40B4-BE49-F238E27FC236}">
-                <a16:creationId xmlns:a16="http://schemas.microsoft.com/office/drawing/2014/main" id="{3823ED87-AD32-4739-9C5C-208049C1F2A7}"/>
-              </a:ext>
-            </a:extLst>
-          </p:cNvPr>
-          <p:cNvSpPr>
-            <a:spLocks noGrp="1"/>
-          </p:cNvSpPr>
-          <p:nvPr>
-            <p:ph type="ctrTitle"/>
-          </p:nvPr>
-        </p:nvSpPr>
-        <p:spPr>
-          <a:xfrm>
-            <a:off x="-959300" y="2131885"/>
-            <a:ext cx="7972873" cy="1297115"/>
-          </a:xfrm>
-        </p:spPr>
-        <p:txBody>
-          <a:bodyPr anchor="t">
-            <a:noAutofit/>
-          </a:bodyPr>
-          <a:lstStyle/>
-          <a:p>
-            <a:r>
-              <a:rPr lang="en-US" sz="8000" b="1" dirty="0">
-                <a:solidFill>
-                  <a:srgbClr val="000000"/>
-                </a:solidFill>
-              </a:rPr>
-              <a:t>FIND THE </a:t>
-            </a:r>
-            <a:br>
-              <a:rPr lang="en-US" sz="8000" b="1" dirty="0">
-                <a:solidFill>
-                  <a:srgbClr val="000000"/>
-                </a:solidFill>
-              </a:rPr>
-            </a:br>
-            <a:r>
-              <a:rPr lang="en-US" sz="8000" b="1" dirty="0">
-                <a:solidFill>
-                  <a:srgbClr val="000000"/>
-                </a:solidFill>
-              </a:rPr>
-              <a:t>TROPHY!</a:t>
-            </a:r>
-          </a:p>
-        </p:txBody>
-      </p:sp>
-      <p:pic>
-        <p:nvPicPr>
-          <p:cNvPr id="5" name="Picture 4">
-            <a:extLst>
-              <a:ext uri="{FF2B5EF4-FFF2-40B4-BE49-F238E27FC236}">
-                <a16:creationId xmlns:a16="http://schemas.microsoft.com/office/drawing/2014/main" id="{E2CFE4B7-2884-8849-91ED-0DF795D30936}"/>
-              </a:ext>
-            </a:extLst>
-          </p:cNvPr>
-          <p:cNvPicPr>
-            <a:picLocks noChangeAspect="1"/>
-          </p:cNvPicPr>
-          <p:nvPr/>
-        </p:nvPicPr>
-        <p:blipFill>
-          <a:blip r:embed="rId2">
-            <a:extLst>
-              <a:ext uri="{28A0092B-C50C-407E-A947-70E740481C1C}">
-                <a14:useLocalDpi xmlns:a14="http://schemas.microsoft.com/office/drawing/2010/main" val="0"/>
-              </a:ext>
-            </a:extLst>
-          </a:blip>
-          <a:stretch>
-            <a:fillRect/>
-          </a:stretch>
-        </p:blipFill>
-        <p:spPr>
-          <a:xfrm>
-            <a:off x="5622757" y="0"/>
-            <a:ext cx="6569243" cy="6858000"/>
-          </a:xfrm>
-          <a:prstGeom prst="rect">
-            <a:avLst/>
-          </a:prstGeom>
-        </p:spPr>
-      </p:pic>
-    </p:spTree>
-    <p:extLst>
-      <p:ext uri="{BB962C8B-B14F-4D97-AF65-F5344CB8AC3E}">
-        <p14:creationId xmlns:p14="http://schemas.microsoft.com/office/powerpoint/2010/main" val="3107353990"/>
-      </p:ext>
-    </p:extLst>
-  </p:cSld>
-  <p:clrMapOvr>
-    <a:masterClrMapping/>
-  </p:clrMapOvr>
-</p:sld>
-</file>
-
-<file path=ppt/slides/slide7.xml><?xml version="1.0" encoding="utf-8"?>
 <p:sld xmlns:a="http://schemas.openxmlformats.org/drawingml/2006/main" xmlns:r="http://schemas.openxmlformats.org/officeDocument/2006/relationships" xmlns:p="http://schemas.openxmlformats.org/presentationml/2006/main">
   <p:cSld>
     <p:spTree>
@@ -5006,7 +4544,7 @@
             <a:noFill/>
             <a:extLst>
               <a:ext uri="{909E8E84-426E-40dd-AFC4-6F175D3DCCD1}">
-                <a14:hiddenFill xmlns="" xmlns:a14="http://schemas.microsoft.com/office/drawing/2010/main">
+                <a14:hiddenFill xmlns:a14="http://schemas.microsoft.com/office/drawing/2010/main" xmlns="">
                   <a:solidFill>
                     <a:srgbClr val="FFFFFF"/>
                   </a:solidFill>
@@ -5051,7 +4589,7 @@
             <a:noFill/>
             <a:extLst>
               <a:ext uri="{909E8E84-426E-40dd-AFC4-6F175D3DCCD1}">
-                <a14:hiddenFill xmlns="" xmlns:a14="http://schemas.microsoft.com/office/drawing/2010/main">
+                <a14:hiddenFill xmlns:a14="http://schemas.microsoft.com/office/drawing/2010/main" xmlns="">
                   <a:solidFill>
                     <a:srgbClr val="FFFFFF"/>
                   </a:solidFill>
@@ -5096,7 +4634,7 @@
             <a:noFill/>
             <a:extLst>
               <a:ext uri="{909E8E84-426E-40dd-AFC4-6F175D3DCCD1}">
-                <a14:hiddenFill xmlns="" xmlns:a14="http://schemas.microsoft.com/office/drawing/2010/main">
+                <a14:hiddenFill xmlns:a14="http://schemas.microsoft.com/office/drawing/2010/main" xmlns="">
                   <a:solidFill>
                     <a:srgbClr val="FFFFFF"/>
                   </a:solidFill>
@@ -5145,6 +4683,549 @@
     <p:extLst>
       <p:ext uri="{BB962C8B-B14F-4D97-AF65-F5344CB8AC3E}">
         <p14:creationId xmlns:p14="http://schemas.microsoft.com/office/powerpoint/2010/main" val="3508478949"/>
+      </p:ext>
+    </p:extLst>
+  </p:cSld>
+  <p:clrMapOvr>
+    <a:masterClrMapping/>
+  </p:clrMapOvr>
+</p:sld>
+</file>
+
+<file path=ppt/slides/slide6.xml><?xml version="1.0" encoding="utf-8"?>
+<p:sld xmlns:a="http://schemas.openxmlformats.org/drawingml/2006/main" xmlns:r="http://schemas.openxmlformats.org/officeDocument/2006/relationships" xmlns:p="http://schemas.openxmlformats.org/presentationml/2006/main">
+  <p:cSld>
+    <p:spTree>
+      <p:nvGrpSpPr>
+        <p:cNvPr id="1" name=""/>
+        <p:cNvGrpSpPr/>
+        <p:nvPr/>
+      </p:nvGrpSpPr>
+      <p:grpSpPr>
+        <a:xfrm>
+          <a:off x="0" y="0"/>
+          <a:ext cx="0" cy="0"/>
+          <a:chOff x="0" y="0"/>
+          <a:chExt cx="0" cy="0"/>
+        </a:xfrm>
+      </p:grpSpPr>
+      <p:sp>
+        <p:nvSpPr>
+          <p:cNvPr id="3" name="Content Placeholder 2">
+            <a:extLst>
+              <a:ext uri="{FF2B5EF4-FFF2-40B4-BE49-F238E27FC236}">
+                <a16:creationId xmlns:a16="http://schemas.microsoft.com/office/drawing/2014/main" id="{B7F24AF1-4C98-47B6-90F9-12C57415B17F}"/>
+              </a:ext>
+            </a:extLst>
+          </p:cNvPr>
+          <p:cNvSpPr>
+            <a:spLocks noGrp="1"/>
+          </p:cNvSpPr>
+          <p:nvPr>
+            <p:ph idx="1"/>
+          </p:nvPr>
+        </p:nvSpPr>
+        <p:spPr>
+          <a:xfrm>
+            <a:off x="60080" y="148908"/>
+            <a:ext cx="12071839" cy="3960235"/>
+          </a:xfrm>
+        </p:spPr>
+        <p:txBody>
+          <a:bodyPr>
+            <a:normAutofit/>
+          </a:bodyPr>
+          <a:lstStyle/>
+          <a:p>
+            <a:pPr marL="0" indent="0" algn="ctr">
+              <a:buNone/>
+            </a:pPr>
+            <a:r>
+              <a:rPr lang="en-US" sz="3600" dirty="0"/>
+              <a:t>INVISIBLE ROUNDS</a:t>
+            </a:r>
+            <a:endParaRPr lang="en-US" sz="3000" b="1" dirty="0"/>
+          </a:p>
+          <a:p>
+            <a:pPr marL="0" indent="0" algn="ctr">
+              <a:buNone/>
+            </a:pPr>
+            <a:r>
+              <a:rPr lang="en-US" dirty="0"/>
+              <a:t>Now that you know where the trophy can be found you will need to locate it when it's </a:t>
+            </a:r>
+            <a:r>
+              <a:rPr lang="en-US" dirty="0">
+                <a:solidFill>
+                  <a:srgbClr val="FF0000"/>
+                </a:solidFill>
+              </a:rPr>
+              <a:t>invisible</a:t>
+            </a:r>
+            <a:r>
+              <a:rPr lang="en-US" dirty="0"/>
+              <a:t>.</a:t>
+            </a:r>
+            <a:r>
+              <a:rPr lang="en-US" dirty="0">
+                <a:solidFill>
+                  <a:srgbClr val="FF0000"/>
+                </a:solidFill>
+              </a:rPr>
+              <a:t> </a:t>
+            </a:r>
+            <a:r>
+              <a:rPr lang="en-US" dirty="0"/>
+              <a:t>On each round, you will first see the “</a:t>
+            </a:r>
+            <a:r>
+              <a:rPr lang="en-US" b="1" dirty="0"/>
+              <a:t>Find The Trophy!” </a:t>
+            </a:r>
+            <a:r>
+              <a:rPr lang="en-US" dirty="0"/>
+              <a:t>screen and then you will be placed into the environment at a random location. When you find the trophy you will hear a sound and the round will end. </a:t>
+            </a:r>
+            <a:endParaRPr lang="en-US" b="1" dirty="0"/>
+          </a:p>
+          <a:p>
+            <a:pPr marL="0" indent="0" algn="ctr">
+              <a:buNone/>
+            </a:pPr>
+            <a:endParaRPr lang="en-US" b="1" dirty="0"/>
+          </a:p>
+        </p:txBody>
+      </p:sp>
+      <p:grpSp>
+        <p:nvGrpSpPr>
+          <p:cNvPr id="8" name="Group 7">
+            <a:extLst>
+              <a:ext uri="{FF2B5EF4-FFF2-40B4-BE49-F238E27FC236}">
+                <a16:creationId xmlns:a16="http://schemas.microsoft.com/office/drawing/2014/main" id="{876D5603-3BAE-45E5-8958-1244B5EC53A7}"/>
+              </a:ext>
+            </a:extLst>
+          </p:cNvPr>
+          <p:cNvGrpSpPr/>
+          <p:nvPr/>
+        </p:nvGrpSpPr>
+        <p:grpSpPr>
+          <a:xfrm>
+            <a:off x="5396254" y="2764519"/>
+            <a:ext cx="4798643" cy="1908548"/>
+            <a:chOff x="5540188" y="3907209"/>
+            <a:chExt cx="4798643" cy="1908548"/>
+          </a:xfrm>
+        </p:grpSpPr>
+        <p:pic>
+          <p:nvPicPr>
+            <p:cNvPr id="9" name="Picture 8">
+              <a:extLst>
+                <a:ext uri="{FF2B5EF4-FFF2-40B4-BE49-F238E27FC236}">
+                  <a16:creationId xmlns:a16="http://schemas.microsoft.com/office/drawing/2014/main" id="{F2C99771-F517-493B-8816-CBE725705682}"/>
+                </a:ext>
+              </a:extLst>
+            </p:cNvPr>
+            <p:cNvPicPr>
+              <a:picLocks noChangeAspect="1"/>
+            </p:cNvPicPr>
+            <p:nvPr/>
+          </p:nvPicPr>
+          <p:blipFill>
+            <a:blip r:embed="rId2"/>
+            <a:stretch>
+              <a:fillRect/>
+            </a:stretch>
+          </p:blipFill>
+          <p:spPr>
+            <a:xfrm>
+              <a:off x="6940084" y="3907209"/>
+              <a:ext cx="3398747" cy="1908548"/>
+            </a:xfrm>
+            <a:prstGeom prst="rect">
+              <a:avLst/>
+            </a:prstGeom>
+            <a:ln w="38100" cap="sq">
+              <a:solidFill>
+                <a:srgbClr val="000000"/>
+              </a:solidFill>
+              <a:prstDash val="solid"/>
+              <a:miter lim="800000"/>
+            </a:ln>
+            <a:effectLst>
+              <a:outerShdw blurRad="50800" dist="38100" dir="2700000" algn="tl" rotWithShape="0">
+                <a:srgbClr val="000000">
+                  <a:alpha val="43000"/>
+                </a:srgbClr>
+              </a:outerShdw>
+            </a:effectLst>
+          </p:spPr>
+        </p:pic>
+        <p:cxnSp>
+          <p:nvCxnSpPr>
+            <p:cNvPr id="10" name="Straight Arrow Connector 9">
+              <a:extLst>
+                <a:ext uri="{FF2B5EF4-FFF2-40B4-BE49-F238E27FC236}">
+                  <a16:creationId xmlns:a16="http://schemas.microsoft.com/office/drawing/2014/main" id="{2E7CCA76-901A-4DCA-BA43-C5A6A14AD4E4}"/>
+                </a:ext>
+              </a:extLst>
+            </p:cNvPr>
+            <p:cNvCxnSpPr>
+              <a:cxnSpLocks/>
+            </p:cNvCxnSpPr>
+            <p:nvPr/>
+          </p:nvCxnSpPr>
+          <p:spPr>
+            <a:xfrm>
+              <a:off x="5540188" y="4861483"/>
+              <a:ext cx="1246831" cy="0"/>
+            </a:xfrm>
+            <a:prstGeom prst="straightConnector1">
+              <a:avLst/>
+            </a:prstGeom>
+            <a:ln w="57150">
+              <a:solidFill>
+                <a:schemeClr val="tx1"/>
+              </a:solidFill>
+              <a:tailEnd type="triangle"/>
+            </a:ln>
+          </p:spPr>
+          <p:style>
+            <a:lnRef idx="1">
+              <a:schemeClr val="accent1"/>
+            </a:lnRef>
+            <a:fillRef idx="0">
+              <a:schemeClr val="accent1"/>
+            </a:fillRef>
+            <a:effectRef idx="0">
+              <a:schemeClr val="accent1"/>
+            </a:effectRef>
+            <a:fontRef idx="minor">
+              <a:schemeClr val="tx1"/>
+            </a:fontRef>
+          </p:style>
+        </p:cxnSp>
+      </p:grpSp>
+      <p:pic>
+        <p:nvPicPr>
+          <p:cNvPr id="11" name="Picture 10">
+            <a:extLst>
+              <a:ext uri="{FF2B5EF4-FFF2-40B4-BE49-F238E27FC236}">
+                <a16:creationId xmlns:a16="http://schemas.microsoft.com/office/drawing/2014/main" id="{0263B739-D44B-43B7-AA01-45DC07CBBB73}"/>
+              </a:ext>
+            </a:extLst>
+          </p:cNvPr>
+          <p:cNvPicPr>
+            <a:picLocks noChangeAspect="1"/>
+          </p:cNvPicPr>
+          <p:nvPr/>
+        </p:nvPicPr>
+        <p:blipFill>
+          <a:blip r:embed="rId3"/>
+          <a:stretch>
+            <a:fillRect/>
+          </a:stretch>
+        </p:blipFill>
+        <p:spPr>
+          <a:xfrm>
+            <a:off x="1742388" y="2764536"/>
+            <a:ext cx="3414724" cy="1908531"/>
+          </a:xfrm>
+          <a:prstGeom prst="rect">
+            <a:avLst/>
+          </a:prstGeom>
+          <a:ln w="38100" cap="sq">
+            <a:solidFill>
+              <a:srgbClr val="000000"/>
+            </a:solidFill>
+            <a:miter lim="800000"/>
+          </a:ln>
+          <a:effectLst>
+            <a:outerShdw blurRad="57150" dist="50800" dir="2700000" algn="tl" rotWithShape="0">
+              <a:srgbClr val="000000">
+                <a:alpha val="40000"/>
+              </a:srgbClr>
+            </a:outerShdw>
+          </a:effectLst>
+        </p:spPr>
+      </p:pic>
+      <p:sp>
+        <p:nvSpPr>
+          <p:cNvPr id="12" name="TextBox 11">
+            <a:extLst>
+              <a:ext uri="{FF2B5EF4-FFF2-40B4-BE49-F238E27FC236}">
+                <a16:creationId xmlns:a16="http://schemas.microsoft.com/office/drawing/2014/main" id="{FA6400F7-6459-634D-BE21-B21692B2875A}"/>
+              </a:ext>
+            </a:extLst>
+          </p:cNvPr>
+          <p:cNvSpPr txBox="1"/>
+          <p:nvPr/>
+        </p:nvSpPr>
+        <p:spPr>
+          <a:xfrm>
+            <a:off x="3704902" y="6036763"/>
+            <a:ext cx="4782193" cy="461665"/>
+          </a:xfrm>
+          <a:prstGeom prst="rect">
+            <a:avLst/>
+          </a:prstGeom>
+          <a:noFill/>
+        </p:spPr>
+        <p:txBody>
+          <a:bodyPr wrap="square" rtlCol="0">
+            <a:spAutoFit/>
+          </a:bodyPr>
+          <a:lstStyle/>
+          <a:p>
+            <a:pPr algn="ctr"/>
+            <a:r>
+              <a:rPr lang="en-US" sz="2400" b="1" dirty="0">
+                <a:solidFill>
+                  <a:schemeClr val="accent6"/>
+                </a:solidFill>
+              </a:rPr>
+              <a:t>Do you have any questions?</a:t>
+            </a:r>
+          </a:p>
+        </p:txBody>
+      </p:sp>
+      <p:sp>
+        <p:nvSpPr>
+          <p:cNvPr id="2" name="Rectangle 1">
+            <a:extLst>
+              <a:ext uri="{FF2B5EF4-FFF2-40B4-BE49-F238E27FC236}">
+                <a16:creationId xmlns:a16="http://schemas.microsoft.com/office/drawing/2014/main" id="{A2562D19-237E-45E9-B314-9A33EC503AE7}"/>
+              </a:ext>
+            </a:extLst>
+          </p:cNvPr>
+          <p:cNvSpPr/>
+          <p:nvPr/>
+        </p:nvSpPr>
+        <p:spPr>
+          <a:xfrm>
+            <a:off x="375781" y="5082656"/>
+            <a:ext cx="11574049" cy="954107"/>
+          </a:xfrm>
+          <a:prstGeom prst="rect">
+            <a:avLst/>
+          </a:prstGeom>
+        </p:spPr>
+        <p:txBody>
+          <a:bodyPr wrap="square">
+            <a:spAutoFit/>
+          </a:bodyPr>
+          <a:lstStyle/>
+          <a:p>
+            <a:pPr algn="ctr"/>
+            <a:r>
+              <a:rPr lang="en-US" sz="2800" dirty="0"/>
+              <a:t>The faster you find the Trophy, the more </a:t>
+            </a:r>
+            <a:r>
+              <a:rPr lang="en-US" sz="2800" b="1" dirty="0"/>
+              <a:t>Bonus Pay </a:t>
+            </a:r>
+            <a:r>
+              <a:rPr lang="en-US" sz="2800" dirty="0"/>
+              <a:t>you’ll earn! You’ll find out how much Bonus you’ve earned at the end of the experiment!</a:t>
+            </a:r>
+            <a:endParaRPr lang="en-US" sz="2800" b="1" dirty="0"/>
+          </a:p>
+        </p:txBody>
+      </p:sp>
+    </p:spTree>
+    <p:extLst>
+      <p:ext uri="{BB962C8B-B14F-4D97-AF65-F5344CB8AC3E}">
+        <p14:creationId xmlns:p14="http://schemas.microsoft.com/office/powerpoint/2010/main" val="4248979816"/>
+      </p:ext>
+    </p:extLst>
+  </p:cSld>
+  <p:clrMapOvr>
+    <a:masterClrMapping/>
+  </p:clrMapOvr>
+</p:sld>
+</file>
+
+<file path=ppt/slides/slide7.xml><?xml version="1.0" encoding="utf-8"?>
+<p:sld xmlns:a="http://schemas.openxmlformats.org/drawingml/2006/main" xmlns:r="http://schemas.openxmlformats.org/officeDocument/2006/relationships" xmlns:p="http://schemas.openxmlformats.org/presentationml/2006/main">
+  <p:cSld>
+    <p:spTree>
+      <p:nvGrpSpPr>
+        <p:cNvPr id="1" name=""/>
+        <p:cNvGrpSpPr/>
+        <p:nvPr/>
+      </p:nvGrpSpPr>
+      <p:grpSpPr>
+        <a:xfrm>
+          <a:off x="0" y="0"/>
+          <a:ext cx="0" cy="0"/>
+          <a:chOff x="0" y="0"/>
+          <a:chExt cx="0" cy="0"/>
+        </a:xfrm>
+      </p:grpSpPr>
+      <p:sp>
+        <p:nvSpPr>
+          <p:cNvPr id="3" name="Content Placeholder 2">
+            <a:extLst>
+              <a:ext uri="{FF2B5EF4-FFF2-40B4-BE49-F238E27FC236}">
+                <a16:creationId xmlns:a16="http://schemas.microsoft.com/office/drawing/2014/main" id="{F30CF4C7-88AC-4C0C-82FC-A71F5AFC0F44}"/>
+              </a:ext>
+            </a:extLst>
+          </p:cNvPr>
+          <p:cNvSpPr>
+            <a:spLocks noGrp="1"/>
+          </p:cNvSpPr>
+          <p:nvPr>
+            <p:ph idx="1"/>
+          </p:nvPr>
+        </p:nvSpPr>
+        <p:spPr>
+          <a:xfrm>
+            <a:off x="0" y="313776"/>
+            <a:ext cx="12192000" cy="5353010"/>
+          </a:xfrm>
+        </p:spPr>
+        <p:txBody>
+          <a:bodyPr>
+            <a:normAutofit/>
+          </a:bodyPr>
+          <a:lstStyle/>
+          <a:p>
+            <a:pPr marL="0" indent="0" algn="ctr">
+              <a:buNone/>
+            </a:pPr>
+            <a:r>
+              <a:rPr lang="en-US" sz="4400" b="1" dirty="0"/>
+              <a:t>GREAT JOB!!</a:t>
+            </a:r>
+          </a:p>
+          <a:p>
+            <a:pPr marL="0" indent="0" algn="ctr">
+              <a:buNone/>
+            </a:pPr>
+            <a:r>
+              <a:rPr lang="en-US" sz="4400" dirty="0"/>
+              <a:t>You earned </a:t>
+            </a:r>
+            <a:r>
+              <a:rPr lang="en-US" sz="4400" dirty="0">
+                <a:solidFill>
+                  <a:schemeClr val="accent6"/>
+                </a:solidFill>
+                <a:latin typeface="Arial Black" panose="020B0A04020102020204" pitchFamily="34" charset="0"/>
+              </a:rPr>
+              <a:t>$5 </a:t>
+            </a:r>
+            <a:r>
+              <a:rPr lang="en-US" sz="4400" dirty="0"/>
+              <a:t>in </a:t>
+            </a:r>
+            <a:r>
+              <a:rPr lang="en-US" sz="4400" b="1" dirty="0"/>
+              <a:t>Bonus Payment </a:t>
+            </a:r>
+            <a:r>
+              <a:rPr lang="en-US" sz="4400" dirty="0"/>
+              <a:t>this Session!!</a:t>
+            </a:r>
+            <a:endParaRPr lang="en-US" sz="4400" b="1" dirty="0"/>
+          </a:p>
+          <a:p>
+            <a:pPr marL="4400550" lvl="8" indent="-742950">
+              <a:buFont typeface="+mj-lt"/>
+              <a:buAutoNum type="arabicPeriod"/>
+            </a:pPr>
+            <a:r>
+              <a:rPr lang="en-US" sz="3000" strike="sngStrike" dirty="0"/>
+              <a:t>Bonus Pay</a:t>
+            </a:r>
+          </a:p>
+          <a:p>
+            <a:pPr marL="4400550" lvl="8" indent="-742950">
+              <a:buFont typeface="+mj-lt"/>
+              <a:buAutoNum type="arabicPeriod"/>
+            </a:pPr>
+            <a:r>
+              <a:rPr lang="en-US" sz="3000" strike="sngStrike" dirty="0"/>
+              <a:t>Find The Trophy</a:t>
+            </a:r>
+          </a:p>
+          <a:p>
+            <a:pPr marL="4400550" lvl="8" indent="-742950">
+              <a:buFont typeface="+mj-lt"/>
+              <a:buAutoNum type="arabicPeriod"/>
+            </a:pPr>
+            <a:r>
+              <a:rPr lang="en-US" sz="3000" b="1" dirty="0"/>
+              <a:t>Survey</a:t>
+            </a:r>
+          </a:p>
+          <a:p>
+            <a:pPr marL="3657600" lvl="8" indent="0">
+              <a:buNone/>
+            </a:pPr>
+            <a:endParaRPr lang="en-US" dirty="0"/>
+          </a:p>
+          <a:p>
+            <a:pPr marL="0" indent="0" algn="ctr">
+              <a:buNone/>
+            </a:pPr>
+            <a:r>
+              <a:rPr lang="en-US" sz="3600" b="1" dirty="0">
+                <a:solidFill>
+                  <a:srgbClr val="C00000"/>
+                </a:solidFill>
+              </a:rPr>
+              <a:t>Please notify the experimenter! </a:t>
+            </a:r>
+          </a:p>
+          <a:p>
+            <a:pPr marL="0" indent="0" algn="ctr">
+              <a:buNone/>
+            </a:pPr>
+            <a:r>
+              <a:rPr lang="en-US" sz="3600" b="1" dirty="0">
+                <a:solidFill>
+                  <a:srgbClr val="C00000"/>
+                </a:solidFill>
+              </a:rPr>
+              <a:t>Do not </a:t>
+            </a:r>
+            <a:r>
+              <a:rPr lang="en-US" sz="3600" dirty="0">
+                <a:solidFill>
+                  <a:srgbClr val="C00000"/>
+                </a:solidFill>
+              </a:rPr>
+              <a:t>press</a:t>
+            </a:r>
+            <a:r>
+              <a:rPr lang="en-US" sz="3600" b="1" dirty="0">
+                <a:solidFill>
+                  <a:srgbClr val="C00000"/>
+                </a:solidFill>
+              </a:rPr>
+              <a:t> </a:t>
+            </a:r>
+            <a:r>
+              <a:rPr lang="en-US" sz="3600" dirty="0">
+                <a:solidFill>
+                  <a:srgbClr val="C00000"/>
+                </a:solidFill>
+              </a:rPr>
+              <a:t>the survey button below until the experimenter instructs you to.</a:t>
+            </a:r>
+            <a:endParaRPr lang="en-US" sz="3200" dirty="0">
+              <a:solidFill>
+                <a:srgbClr val="C00000"/>
+              </a:solidFill>
+            </a:endParaRPr>
+          </a:p>
+        </p:txBody>
+      </p:sp>
+    </p:spTree>
+    <p:extLst>
+      <p:ext uri="{BB962C8B-B14F-4D97-AF65-F5344CB8AC3E}">
+        <p14:creationId xmlns:p14="http://schemas.microsoft.com/office/powerpoint/2010/main" val="136332127"/>
       </p:ext>
     </p:extLst>
   </p:cSld>
@@ -5173,155 +5254,98 @@
       </p:grpSpPr>
       <p:sp>
         <p:nvSpPr>
-          <p:cNvPr id="3" name="Content Placeholder 2">
-            <a:extLst>
-              <a:ext uri="{FF2B5EF4-FFF2-40B4-BE49-F238E27FC236}">
-                <a16:creationId xmlns:a16="http://schemas.microsoft.com/office/drawing/2014/main" id="{F30CF4C7-88AC-4C0C-82FC-A71F5AFC0F44}"/>
-              </a:ext>
-            </a:extLst>
-          </p:cNvPr>
-          <p:cNvSpPr>
-            <a:spLocks noGrp="1"/>
-          </p:cNvSpPr>
-          <p:nvPr>
-            <p:ph idx="1"/>
+          <p:cNvPr id="2" name="Title 1">
+            <a:extLst>
+              <a:ext uri="{FF2B5EF4-FFF2-40B4-BE49-F238E27FC236}">
+                <a16:creationId xmlns:a16="http://schemas.microsoft.com/office/drawing/2014/main" id="{3823ED87-AD32-4739-9C5C-208049C1F2A7}"/>
+              </a:ext>
+            </a:extLst>
+          </p:cNvPr>
+          <p:cNvSpPr>
+            <a:spLocks noGrp="1"/>
+          </p:cNvSpPr>
+          <p:nvPr>
+            <p:ph type="ctrTitle"/>
           </p:nvPr>
         </p:nvSpPr>
         <p:spPr>
           <a:xfrm>
-            <a:off x="0" y="313776"/>
-            <a:ext cx="12192000" cy="5353010"/>
+            <a:off x="-959300" y="2131885"/>
+            <a:ext cx="7972873" cy="1297115"/>
           </a:xfrm>
         </p:spPr>
         <p:txBody>
-          <a:bodyPr>
-            <a:normAutofit/>
+          <a:bodyPr anchor="t">
+            <a:noAutofit/>
           </a:bodyPr>
           <a:lstStyle/>
           <a:p>
-            <a:pPr marL="0" indent="0" algn="ctr">
-              <a:buNone/>
-            </a:pPr>
-            <a:r>
-              <a:rPr lang="en-US" sz="4400" b="1" dirty="0"/>
-              <a:t>GREAT JOB!!</a:t>
-            </a:r>
-          </a:p>
-          <a:p>
-            <a:pPr marL="0" indent="0" algn="ctr">
-              <a:buNone/>
-            </a:pPr>
-            <a:r>
-              <a:rPr lang="en-US" sz="4400" dirty="0"/>
-              <a:t>You’ve completed the </a:t>
-            </a:r>
-            <a:r>
-              <a:rPr lang="en-US" sz="4400" b="1" dirty="0"/>
-              <a:t>FIND THE TROPHY </a:t>
-            </a:r>
-            <a:r>
-              <a:rPr lang="en-US" sz="4400" dirty="0"/>
-              <a:t>section!</a:t>
-            </a:r>
-            <a:endParaRPr lang="en-US" sz="4400" b="1" dirty="0"/>
-          </a:p>
-          <a:p>
-            <a:pPr marL="4400550" lvl="8" indent="-742950">
-              <a:buFont typeface="+mj-lt"/>
-              <a:buAutoNum type="arabicPeriod"/>
-            </a:pPr>
-            <a:r>
-              <a:rPr lang="en-US" sz="3000" strike="sngStrike" dirty="0"/>
-              <a:t>Bonus Pay</a:t>
-            </a:r>
-          </a:p>
-          <a:p>
-            <a:pPr marL="4400550" lvl="8" indent="-742950">
-              <a:buFont typeface="+mj-lt"/>
-              <a:buAutoNum type="arabicPeriod"/>
-            </a:pPr>
-            <a:r>
-              <a:rPr lang="en-US" sz="3000" strike="sngStrike" dirty="0"/>
-              <a:t>Find The Trophy</a:t>
-            </a:r>
-          </a:p>
-          <a:p>
-            <a:pPr marL="4400550" lvl="8" indent="-742950">
-              <a:buFont typeface="+mj-lt"/>
-              <a:buAutoNum type="arabicPeriod"/>
-            </a:pPr>
-            <a:r>
-              <a:rPr lang="en-US" sz="3000" b="1" dirty="0"/>
-              <a:t>Survey</a:t>
-            </a:r>
-          </a:p>
-          <a:p>
-            <a:pPr marL="3657600" lvl="8" indent="0">
-              <a:buNone/>
-            </a:pPr>
-            <a:endParaRPr lang="en-US" dirty="0"/>
-          </a:p>
-          <a:p>
-            <a:pPr marL="0" indent="0" algn="ctr">
-              <a:buNone/>
-            </a:pPr>
-            <a:r>
-              <a:rPr lang="en-US" sz="3600" b="1" dirty="0">
+            <a:r>
+              <a:rPr lang="en-US" sz="8000" b="1" dirty="0">
                 <a:solidFill>
-                  <a:srgbClr val="C00000"/>
+                  <a:srgbClr val="000000"/>
                 </a:solidFill>
               </a:rPr>
-              <a:t>Please notify the experimenter! </a:t>
-            </a:r>
-          </a:p>
-          <a:p>
-            <a:pPr marL="0" indent="0" algn="ctr">
-              <a:buNone/>
-            </a:pPr>
-            <a:r>
-              <a:rPr lang="en-US" sz="3600" b="1" dirty="0">
+              <a:t>FIND THE </a:t>
+            </a:r>
+            <a:br>
+              <a:rPr lang="en-US" sz="8000" b="1" dirty="0">
                 <a:solidFill>
-                  <a:srgbClr val="C00000"/>
+                  <a:srgbClr val="000000"/>
                 </a:solidFill>
               </a:rPr>
-              <a:t>Do not </a:t>
-            </a:r>
-            <a:r>
-              <a:rPr lang="en-US" sz="3600" dirty="0">
+            </a:br>
+            <a:r>
+              <a:rPr lang="en-US" sz="8000" b="1" dirty="0">
                 <a:solidFill>
-                  <a:srgbClr val="C00000"/>
+                  <a:srgbClr val="000000"/>
                 </a:solidFill>
               </a:rPr>
-              <a:t>press</a:t>
-            </a:r>
-            <a:r>
-              <a:rPr lang="en-US" sz="3600" b="1" dirty="0">
-                <a:solidFill>
-                  <a:srgbClr val="C00000"/>
-                </a:solidFill>
-              </a:rPr>
-              <a:t> </a:t>
-            </a:r>
-            <a:r>
-              <a:rPr lang="en-US" sz="3600" dirty="0">
-                <a:solidFill>
-                  <a:srgbClr val="C00000"/>
-                </a:solidFill>
-              </a:rPr>
-              <a:t>the survey button below until you have been instructed to by the experimenter!</a:t>
-            </a:r>
-            <a:endParaRPr lang="en-US" sz="3200" dirty="0">
-              <a:solidFill>
-                <a:srgbClr val="C00000"/>
-              </a:solidFill>
-            </a:endParaRPr>
-          </a:p>
-        </p:txBody>
-      </p:sp>
+              <a:t>TROPHY!</a:t>
+            </a:r>
+          </a:p>
+        </p:txBody>
+      </p:sp>
+      <p:pic>
+        <p:nvPicPr>
+          <p:cNvPr id="5" name="Picture 4">
+            <a:extLst>
+              <a:ext uri="{FF2B5EF4-FFF2-40B4-BE49-F238E27FC236}">
+                <a16:creationId xmlns:a16="http://schemas.microsoft.com/office/drawing/2014/main" id="{E2CFE4B7-2884-8849-91ED-0DF795D30936}"/>
+              </a:ext>
+            </a:extLst>
+          </p:cNvPr>
+          <p:cNvPicPr>
+            <a:picLocks noChangeAspect="1"/>
+          </p:cNvPicPr>
+          <p:nvPr/>
+        </p:nvPicPr>
+        <p:blipFill>
+          <a:blip r:embed="rId2">
+            <a:extLst>
+              <a:ext uri="{28A0092B-C50C-407E-A947-70E740481C1C}">
+                <a14:useLocalDpi xmlns:a14="http://schemas.microsoft.com/office/drawing/2010/main" val="0"/>
+              </a:ext>
+            </a:extLst>
+          </a:blip>
+          <a:stretch>
+            <a:fillRect/>
+          </a:stretch>
+        </p:blipFill>
+        <p:spPr>
+          <a:xfrm>
+            <a:off x="5622757" y="0"/>
+            <a:ext cx="6569243" cy="6858000"/>
+          </a:xfrm>
+          <a:prstGeom prst="rect">
+            <a:avLst/>
+          </a:prstGeom>
+        </p:spPr>
+      </p:pic>
     </p:spTree>
     <p:extLst>
       <p:ext uri="{BB962C8B-B14F-4D97-AF65-F5344CB8AC3E}">
-        <p14:creationId xmlns:p14="http://schemas.microsoft.com/office/powerpoint/2010/main" val="136332127"/>
+        <p14:creationId xmlns:p14="http://schemas.microsoft.com/office/powerpoint/2010/main" val="3107353990"/>
       </p:ext>
     </p:extLst>
   </p:cSld>

</xml_diff>